<commit_message>
Add FEKT registration link.
</commit_message>
<xml_diff>
--- a/Lectures/IW5-02-OOP_EF.pptx
+++ b/Lectures/IW5-02-OOP_EF.pptx
@@ -22771,7 +22771,7 @@
         <p:spPr>
           <a:xfrm>
             <a:off x="539749" y="1412874"/>
-            <a:ext cx="6769101" cy="3312287"/>
+            <a:ext cx="7776719" cy="3312287"/>
           </a:xfrm>
         </p:spPr>
         <p:txBody>
@@ -22820,17 +22820,17 @@
             </a:r>
             <a:r>
               <a:rPr lang="en-US" dirty="0">
-                <a:solidFill>
-                  <a:srgbClr val="FF0000"/>
-                </a:solidFill>
-              </a:rPr>
-              <a:t>TODO</a:t>
-            </a:r>
-            <a:endParaRPr lang="cs-CZ" dirty="0">
-              <a:solidFill>
-                <a:srgbClr val="FF0000"/>
-              </a:solidFill>
-            </a:endParaRPr>
+                <a:hlinkClick r:id="rId3" action="ppaction://hlinkfile"/>
+              </a:rPr>
+              <a:t>goo.gl/</a:t>
+            </a:r>
+            <a:r>
+              <a:rPr lang="en-US" dirty="0" err="1">
+                <a:hlinkClick r:id="rId3" action="ppaction://hlinkfile"/>
+              </a:rPr>
+              <a:t>cBXSLd</a:t>
+            </a:r>
+            <a:endParaRPr lang="cs-CZ" dirty="0"/>
           </a:p>
           <a:p>
             <a:pPr lvl="1">
@@ -22840,23 +22840,23 @@
               <a:buFont typeface="Arial" pitchFamily="34" charset="0"/>
               <a:buChar char="•"/>
             </a:pPr>
-            <a:endParaRPr lang="cs-CZ" dirty="0"/>
-          </a:p>
-          <a:p>
-            <a:pPr lvl="1">
-              <a:lnSpc>
-                <a:spcPct val="150000"/>
-              </a:lnSpc>
-              <a:buFont typeface="Arial" pitchFamily="34" charset="0"/>
-              <a:buChar char="•"/>
-            </a:pPr>
             <a:r>
               <a:rPr lang="cs-CZ" dirty="0"/>
               <a:t>Zadání viz</a:t>
             </a:r>
             <a:r>
               <a:rPr lang="en-US" dirty="0"/>
-              <a:t> GitHub</a:t>
+              <a:t> </a:t>
+            </a:r>
+            <a:r>
+              <a:rPr lang="en-US" dirty="0">
+                <a:hlinkClick r:id="rId4"/>
+              </a:rPr>
+              <a:t>GitHub</a:t>
+            </a:r>
+            <a:r>
+              <a:rPr lang="en-US" dirty="0"/>
+              <a:t>	</a:t>
             </a:r>
             <a:br>
               <a:rPr lang="en-US" dirty="0"/>
@@ -39645,44 +39645,29 @@
           </a:p>
         </p:txBody>
       </p:sp>
-      <p:sp>
-        <p:nvSpPr>
-          <p:cNvPr id="3" name="Content Placeholder 2"/>
-          <p:cNvSpPr>
-            <a:spLocks noGrp="1"/>
-          </p:cNvSpPr>
-          <p:nvPr>
-            <p:ph idx="1"/>
-          </p:nvPr>
-        </p:nvSpPr>
-        <p:spPr/>
-        <p:txBody>
-          <a:bodyPr/>
-          <a:lstStyle/>
-          <a:p>
-            <a:endParaRPr lang="en-US"/>
-          </a:p>
-        </p:txBody>
-      </p:sp>
-      <p:sp>
-        <p:nvSpPr>
-          <p:cNvPr id="4" name="Content Placeholder 3"/>
-          <p:cNvSpPr>
-            <a:spLocks noGrp="1"/>
-          </p:cNvSpPr>
-          <p:nvPr>
-            <p:ph sz="quarter" idx="13"/>
-          </p:nvPr>
-        </p:nvSpPr>
-        <p:spPr/>
-        <p:txBody>
-          <a:bodyPr/>
-          <a:lstStyle/>
-          <a:p>
-            <a:endParaRPr lang="en-US"/>
-          </a:p>
-        </p:txBody>
-      </p:sp>
+      <p:pic>
+        <p:nvPicPr>
+          <p:cNvPr id="8" name="Picture 7"/>
+          <p:cNvPicPr>
+            <a:picLocks noChangeAspect="1"/>
+          </p:cNvPicPr>
+          <p:nvPr/>
+        </p:nvPicPr>
+        <p:blipFill rotWithShape="1">
+          <a:blip r:embed="rId2"/>
+          <a:srcRect l="24849" t="18039" r="21311" b="14316"/>
+          <a:stretch/>
+        </p:blipFill>
+        <p:spPr>
+          <a:xfrm>
+            <a:off x="1403604" y="2564892"/>
+            <a:ext cx="6394396" cy="2459384"/>
+          </a:xfrm>
+          <a:prstGeom prst="rect">
+            <a:avLst/>
+          </a:prstGeom>
+        </p:spPr>
+      </p:pic>
     </p:spTree>
     <p:extLst>
       <p:ext uri="{BB962C8B-B14F-4D97-AF65-F5344CB8AC3E}">
@@ -43662,15 +43647,6 @@
 </file>
 
 <file path=customXml/item1.xml><?xml version="1.0" encoding="utf-8"?>
-<?mso-contentType ?>
-<FormTemplates xmlns="http://schemas.microsoft.com/sharepoint/v3/contenttype/forms">
-  <Display>DocumentLibraryForm</Display>
-  <Edit>DocumentLibraryForm</Edit>
-  <New>DocumentLibraryForm</New>
-</FormTemplates>
-</file>
-
-<file path=customXml/item2.xml><?xml version="1.0" encoding="utf-8"?>
 <p:properties xmlns:p="http://schemas.microsoft.com/office/2006/metadata/properties" xmlns:xsi="http://www.w3.org/2001/XMLSchema-instance">
   <documentManagement>
     <Typ_x0020__x0161_ablony xmlns="305ed015-8565-4686-8245-5a6f6608d307">Prezentace (Presentation)</Typ_x0020__x0161_ablony>
@@ -43682,7 +43658,7 @@
 </p:properties>
 </file>
 
-<file path=customXml/item3.xml><?xml version="1.0" encoding="utf-8"?>
+<file path=customXml/item2.xml><?xml version="1.0" encoding="utf-8"?>
 <ct:contentTypeSchema xmlns:ct="http://schemas.microsoft.com/office/2006/metadata/contentType" xmlns:ma="http://schemas.microsoft.com/office/2006/metadata/properties/metaAttributes" ct:_="" ma:_="" ma:contentTypeName="Document" ma:contentTypeID="0x01010043E1F1D228625A40A2DD89FD0D534334" ma:contentTypeVersion="5" ma:contentTypeDescription="Create a new document." ma:contentTypeScope="" ma:versionID="3c3cdac864ea44490d5feb2289df447b">
   <xsd:schema xmlns:xsd="http://www.w3.org/2001/XMLSchema" xmlns:p="http://schemas.microsoft.com/office/2006/metadata/properties" xmlns:ns2="305ed015-8565-4686-8245-5a6f6608d307" targetNamespace="http://schemas.microsoft.com/office/2006/metadata/properties" ma:root="true" ma:fieldsID="41e535ac8a181a7ae43b4c19f50876ca" ns2:_="">
     <xsd:import namespace="305ed015-8565-4686-8245-5a6f6608d307"/>
@@ -43849,15 +43825,16 @@
 </ct:contentTypeSchema>
 </file>
 
-<file path=customXml/itemProps1.xml><?xml version="1.0" encoding="utf-8"?>
-<ds:datastoreItem xmlns:ds="http://schemas.openxmlformats.org/officeDocument/2006/customXml" ds:itemID="{68E9ACD9-562C-4E45-98C9-78111DF73B73}">
-  <ds:schemaRefs>
-    <ds:schemaRef ds:uri="http://schemas.microsoft.com/sharepoint/v3/contenttype/forms"/>
-  </ds:schemaRefs>
-</ds:datastoreItem>
+<file path=customXml/item3.xml><?xml version="1.0" encoding="utf-8"?>
+<?mso-contentType ?>
+<FormTemplates xmlns="http://schemas.microsoft.com/sharepoint/v3/contenttype/forms">
+  <Display>DocumentLibraryForm</Display>
+  <Edit>DocumentLibraryForm</Edit>
+  <New>DocumentLibraryForm</New>
+</FormTemplates>
 </file>
 
-<file path=customXml/itemProps2.xml><?xml version="1.0" encoding="utf-8"?>
+<file path=customXml/itemProps1.xml><?xml version="1.0" encoding="utf-8"?>
 <ds:datastoreItem xmlns:ds="http://schemas.openxmlformats.org/officeDocument/2006/customXml" ds:itemID="{FA78BBDB-95CB-4C59-A8AB-58166EF53EC4}">
   <ds:schemaRefs>
     <ds:schemaRef ds:uri="http://purl.org/dc/dcmitype/"/>
@@ -43872,7 +43849,7 @@
 </ds:datastoreItem>
 </file>
 
-<file path=customXml/itemProps3.xml><?xml version="1.0" encoding="utf-8"?>
+<file path=customXml/itemProps2.xml><?xml version="1.0" encoding="utf-8"?>
 <ds:datastoreItem xmlns:ds="http://schemas.openxmlformats.org/officeDocument/2006/customXml" ds:itemID="{257903E7-1042-4F60-A78F-E2DF85502085}">
   <ds:schemaRefs>
     <ds:schemaRef ds:uri="http://schemas.microsoft.com/office/2006/metadata/contentType"/>
@@ -43887,4 +43864,12 @@
     <ds:schemaRef ds:uri="http://schemas.microsoft.com/office/internal/2005/internalDocumentation"/>
   </ds:schemaRefs>
 </ds:datastoreItem>
+</file>
+
+<file path=customXml/itemProps3.xml><?xml version="1.0" encoding="utf-8"?>
+<ds:datastoreItem xmlns:ds="http://schemas.openxmlformats.org/officeDocument/2006/customXml" ds:itemID="{68E9ACD9-562C-4E45-98C9-78111DF73B73}">
+  <ds:schemaRefs>
+    <ds:schemaRef ds:uri="http://schemas.microsoft.com/sharepoint/v3/contenttype/forms"/>
+  </ds:schemaRefs>
+</ds:datastoreItem>
 </file>
</xml_diff>

<commit_message>
Fix title and date
</commit_message>
<xml_diff>
--- a/Lectures/IW5-02-OOP_EF.pptx
+++ b/Lectures/IW5-02-OOP_EF.pptx
@@ -12537,7 +12537,7 @@
                   <a:schemeClr val="tx1"/>
                 </a:solidFill>
               </a:rPr>
-              <a:t>22. </a:t>
+              <a:t>13. </a:t>
             </a:r>
             <a:r>
               <a:rPr lang="cs-CZ" sz="1000" noProof="0" dirty="0">
@@ -12936,31 +12936,8 @@
                   <a:schemeClr val="tx1"/>
                 </a:solidFill>
               </a:rPr>
-              <a:t>Ing. Jan Pluskal, </a:t>
-            </a:r>
-            <a:r>
-              <a:rPr lang="cs-CZ" sz="1000" noProof="0" dirty="0">
-                <a:solidFill>
-                  <a:schemeClr val="tx1"/>
-                </a:solidFill>
-              </a:rPr>
-              <a:t>Ing. Martin Minařík, Ph.D.</a:t>
-            </a:r>
-          </a:p>
-          <a:p>
-            <a:pPr algn="r">
-              <a:lnSpc>
-                <a:spcPct val="110000"/>
-              </a:lnSpc>
-              <a:spcBef>
-                <a:spcPts val="0"/>
-              </a:spcBef>
-            </a:pPr>
-            <a:endParaRPr lang="en-US" sz="1000" noProof="0" dirty="0">
-              <a:solidFill>
-                <a:schemeClr val="tx1"/>
-              </a:solidFill>
-            </a:endParaRPr>
+              <a:t>Ing. Jan Pluskal</a:t>
+            </a:r>
           </a:p>
         </p:txBody>
       </p:sp>
@@ -13000,13 +12977,32 @@
                   <a:schemeClr val="tx1"/>
                 </a:solidFill>
               </a:rPr>
-              <a:t>03 – OOP &amp; C#</a:t>
-            </a:r>
-            <a:endParaRPr lang="en-US" sz="1000" noProof="0" dirty="0">
-              <a:solidFill>
-                <a:schemeClr val="tx1"/>
-              </a:solidFill>
-            </a:endParaRPr>
+              <a:t>0</a:t>
+            </a:r>
+            <a:r>
+              <a:rPr lang="en-US" sz="1000" noProof="0" dirty="0">
+                <a:solidFill>
+                  <a:schemeClr val="tx1"/>
+                </a:solidFill>
+              </a:rPr>
+              <a:t>2</a:t>
+            </a:r>
+            <a:r>
+              <a:rPr lang="cs-CZ" sz="1000" noProof="0" dirty="0">
+                <a:solidFill>
+                  <a:schemeClr val="tx1"/>
+                </a:solidFill>
+              </a:rPr>
+              <a:t> – OOP &amp; </a:t>
+            </a:r>
+            <a:r>
+              <a:rPr lang="en-US" sz="1000" noProof="0" dirty="0">
+                <a:solidFill>
+                  <a:schemeClr val="tx1"/>
+                </a:solidFill>
+              </a:rPr>
+              <a:t>C#, Entity Framework</a:t>
+            </a:r>
           </a:p>
         </p:txBody>
       </p:sp>
@@ -13565,11 +13561,19 @@
           <a:p>
             <a:r>
               <a:rPr lang="cs-CZ" dirty="0"/>
-              <a:t>03 – OOP </a:t>
+              <a:t>0</a:t>
             </a:r>
             <a:r>
               <a:rPr lang="en-US" dirty="0"/>
-              <a:t>&amp; C#</a:t>
+              <a:t>2</a:t>
+            </a:r>
+            <a:r>
+              <a:rPr lang="cs-CZ" dirty="0"/>
+              <a:t> – OOP </a:t>
+            </a:r>
+            <a:r>
+              <a:rPr lang="en-US" dirty="0"/>
+              <a:t>&amp; C#, Entity Framework</a:t>
             </a:r>
             <a:endParaRPr lang="cs-CZ" dirty="0"/>
           </a:p>
@@ -38648,7 +38652,7 @@
             </a:r>
             <a:r>
               <a:rPr lang="en-US" dirty="0"/>
-              <a:t>		(</a:t>
+              <a:t>		              (</a:t>
             </a:r>
             <a:r>
               <a:rPr lang="en-US" dirty="0" err="1"/>
@@ -43647,18 +43651,6 @@
 </file>
 
 <file path=customXml/item1.xml><?xml version="1.0" encoding="utf-8"?>
-<p:properties xmlns:p="http://schemas.microsoft.com/office/2006/metadata/properties" xmlns:xsi="http://www.w3.org/2001/XMLSchema-instance">
-  <documentManagement>
-    <Typ_x0020__x0161_ablony xmlns="305ed015-8565-4686-8245-5a6f6608d307">Prezentace (Presentation)</Typ_x0020__x0161_ablony>
-    <Org_x0020_Jednotka xmlns="305ed015-8565-4686-8245-5a6f6608d307">ALL</Org_x0020_Jednotka>
-    <Jazyk xmlns="305ed015-8565-4686-8245-5a6f6608d307">CZ</Jazyk>
-    <Vlastn_x00ed_k xmlns="305ed015-8565-4686-8245-5a6f6608d307">CC</Vlastn_x00ed_k>
-    <T_x00e9_ma xmlns="305ed015-8565-4686-8245-5a6f6608d307">Marketing</T_x00e9_ma>
-  </documentManagement>
-</p:properties>
-</file>
-
-<file path=customXml/item2.xml><?xml version="1.0" encoding="utf-8"?>
 <ct:contentTypeSchema xmlns:ct="http://schemas.microsoft.com/office/2006/metadata/contentType" xmlns:ma="http://schemas.microsoft.com/office/2006/metadata/properties/metaAttributes" ct:_="" ma:_="" ma:contentTypeName="Document" ma:contentTypeID="0x01010043E1F1D228625A40A2DD89FD0D534334" ma:contentTypeVersion="5" ma:contentTypeDescription="Create a new document." ma:contentTypeScope="" ma:versionID="3c3cdac864ea44490d5feb2289df447b">
   <xsd:schema xmlns:xsd="http://www.w3.org/2001/XMLSchema" xmlns:p="http://schemas.microsoft.com/office/2006/metadata/properties" xmlns:ns2="305ed015-8565-4686-8245-5a6f6608d307" targetNamespace="http://schemas.microsoft.com/office/2006/metadata/properties" ma:root="true" ma:fieldsID="41e535ac8a181a7ae43b4c19f50876ca" ns2:_="">
     <xsd:import namespace="305ed015-8565-4686-8245-5a6f6608d307"/>
@@ -43825,7 +43817,7 @@
 </ct:contentTypeSchema>
 </file>
 
-<file path=customXml/item3.xml><?xml version="1.0" encoding="utf-8"?>
+<file path=customXml/item2.xml><?xml version="1.0" encoding="utf-8"?>
 <?mso-contentType ?>
 <FormTemplates xmlns="http://schemas.microsoft.com/sharepoint/v3/contenttype/forms">
   <Display>DocumentLibraryForm</Display>
@@ -43834,22 +43826,19 @@
 </FormTemplates>
 </file>
 
-<file path=customXml/itemProps1.xml><?xml version="1.0" encoding="utf-8"?>
-<ds:datastoreItem xmlns:ds="http://schemas.openxmlformats.org/officeDocument/2006/customXml" ds:itemID="{FA78BBDB-95CB-4C59-A8AB-58166EF53EC4}">
-  <ds:schemaRefs>
-    <ds:schemaRef ds:uri="http://purl.org/dc/dcmitype/"/>
-    <ds:schemaRef ds:uri="http://purl.org/dc/elements/1.1/"/>
-    <ds:schemaRef ds:uri="http://schemas.microsoft.com/office/2006/metadata/properties"/>
-    <ds:schemaRef ds:uri="http://schemas.microsoft.com/office/2006/documentManagement/types"/>
-    <ds:schemaRef ds:uri="305ed015-8565-4686-8245-5a6f6608d307"/>
-    <ds:schemaRef ds:uri="http://purl.org/dc/terms/"/>
-    <ds:schemaRef ds:uri="http://schemas.openxmlformats.org/package/2006/metadata/core-properties"/>
-    <ds:schemaRef ds:uri="http://www.w3.org/XML/1998/namespace"/>
-  </ds:schemaRefs>
-</ds:datastoreItem>
+<file path=customXml/item3.xml><?xml version="1.0" encoding="utf-8"?>
+<p:properties xmlns:p="http://schemas.microsoft.com/office/2006/metadata/properties" xmlns:xsi="http://www.w3.org/2001/XMLSchema-instance">
+  <documentManagement>
+    <Typ_x0020__x0161_ablony xmlns="305ed015-8565-4686-8245-5a6f6608d307">Prezentace (Presentation)</Typ_x0020__x0161_ablony>
+    <Org_x0020_Jednotka xmlns="305ed015-8565-4686-8245-5a6f6608d307">ALL</Org_x0020_Jednotka>
+    <Jazyk xmlns="305ed015-8565-4686-8245-5a6f6608d307">CZ</Jazyk>
+    <Vlastn_x00ed_k xmlns="305ed015-8565-4686-8245-5a6f6608d307">CC</Vlastn_x00ed_k>
+    <T_x00e9_ma xmlns="305ed015-8565-4686-8245-5a6f6608d307">Marketing</T_x00e9_ma>
+  </documentManagement>
+</p:properties>
 </file>
 
-<file path=customXml/itemProps2.xml><?xml version="1.0" encoding="utf-8"?>
+<file path=customXml/itemProps1.xml><?xml version="1.0" encoding="utf-8"?>
 <ds:datastoreItem xmlns:ds="http://schemas.openxmlformats.org/officeDocument/2006/customXml" ds:itemID="{257903E7-1042-4F60-A78F-E2DF85502085}">
   <ds:schemaRefs>
     <ds:schemaRef ds:uri="http://schemas.microsoft.com/office/2006/metadata/contentType"/>
@@ -43866,10 +43855,25 @@
 </ds:datastoreItem>
 </file>
 
-<file path=customXml/itemProps3.xml><?xml version="1.0" encoding="utf-8"?>
+<file path=customXml/itemProps2.xml><?xml version="1.0" encoding="utf-8"?>
 <ds:datastoreItem xmlns:ds="http://schemas.openxmlformats.org/officeDocument/2006/customXml" ds:itemID="{68E9ACD9-562C-4E45-98C9-78111DF73B73}">
   <ds:schemaRefs>
     <ds:schemaRef ds:uri="http://schemas.microsoft.com/sharepoint/v3/contenttype/forms"/>
   </ds:schemaRefs>
 </ds:datastoreItem>
+</file>
+
+<file path=customXml/itemProps3.xml><?xml version="1.0" encoding="utf-8"?>
+<ds:datastoreItem xmlns:ds="http://schemas.openxmlformats.org/officeDocument/2006/customXml" ds:itemID="{FA78BBDB-95CB-4C59-A8AB-58166EF53EC4}">
+  <ds:schemaRefs>
+    <ds:schemaRef ds:uri="http://purl.org/dc/dcmitype/"/>
+    <ds:schemaRef ds:uri="http://purl.org/dc/elements/1.1/"/>
+    <ds:schemaRef ds:uri="http://schemas.microsoft.com/office/2006/metadata/properties"/>
+    <ds:schemaRef ds:uri="http://schemas.microsoft.com/office/2006/documentManagement/types"/>
+    <ds:schemaRef ds:uri="305ed015-8565-4686-8245-5a6f6608d307"/>
+    <ds:schemaRef ds:uri="http://purl.org/dc/terms/"/>
+    <ds:schemaRef ds:uri="http://schemas.openxmlformats.org/package/2006/metadata/core-properties"/>
+    <ds:schemaRef ds:uri="http://www.w3.org/XML/1998/namespace"/>
+  </ds:schemaRefs>
+</ds:datastoreItem>
 </file>
</xml_diff>

<commit_message>
Fix FEKT registration link.
</commit_message>
<xml_diff>
--- a/Lectures/IW5-02-OOP_EF.pptx
+++ b/Lectures/IW5-02-OOP_EF.pptx
@@ -22820,19 +22820,13 @@
             </a:pPr>
             <a:r>
               <a:rPr lang="cs-CZ" dirty="0"/>
-              <a:t>FEKT - </a:t>
-            </a:r>
-            <a:r>
-              <a:rPr lang="en-US" dirty="0">
-                <a:hlinkClick r:id="rId3" action="ppaction://hlinkfile"/>
-              </a:rPr>
-              <a:t>goo.gl/</a:t>
-            </a:r>
-            <a:r>
-              <a:rPr lang="en-US" dirty="0" err="1">
-                <a:hlinkClick r:id="rId3" action="ppaction://hlinkfile"/>
-              </a:rPr>
-              <a:t>cBXSLd</a:t>
+              <a:t>FEKT – </a:t>
+            </a:r>
+            <a:r>
+              <a:rPr lang="en-US" dirty="0">
+                <a:hlinkClick r:id="rId3"/>
+              </a:rPr>
+              <a:t>http://goo.gl/cBXSLd</a:t>
             </a:r>
             <a:endParaRPr lang="cs-CZ" dirty="0"/>
           </a:p>
@@ -43651,6 +43645,27 @@
 </file>
 
 <file path=customXml/item1.xml><?xml version="1.0" encoding="utf-8"?>
+<?mso-contentType ?>
+<FormTemplates xmlns="http://schemas.microsoft.com/sharepoint/v3/contenttype/forms">
+  <Display>DocumentLibraryForm</Display>
+  <Edit>DocumentLibraryForm</Edit>
+  <New>DocumentLibraryForm</New>
+</FormTemplates>
+</file>
+
+<file path=customXml/item2.xml><?xml version="1.0" encoding="utf-8"?>
+<p:properties xmlns:p="http://schemas.microsoft.com/office/2006/metadata/properties" xmlns:xsi="http://www.w3.org/2001/XMLSchema-instance">
+  <documentManagement>
+    <Typ_x0020__x0161_ablony xmlns="305ed015-8565-4686-8245-5a6f6608d307">Prezentace (Presentation)</Typ_x0020__x0161_ablony>
+    <Org_x0020_Jednotka xmlns="305ed015-8565-4686-8245-5a6f6608d307">ALL</Org_x0020_Jednotka>
+    <Jazyk xmlns="305ed015-8565-4686-8245-5a6f6608d307">CZ</Jazyk>
+    <Vlastn_x00ed_k xmlns="305ed015-8565-4686-8245-5a6f6608d307">CC</Vlastn_x00ed_k>
+    <T_x00e9_ma xmlns="305ed015-8565-4686-8245-5a6f6608d307">Marketing</T_x00e9_ma>
+  </documentManagement>
+</p:properties>
+</file>
+
+<file path=customXml/item3.xml><?xml version="1.0" encoding="utf-8"?>
 <ct:contentTypeSchema xmlns:ct="http://schemas.microsoft.com/office/2006/metadata/contentType" xmlns:ma="http://schemas.microsoft.com/office/2006/metadata/properties/metaAttributes" ct:_="" ma:_="" ma:contentTypeName="Document" ma:contentTypeID="0x01010043E1F1D228625A40A2DD89FD0D534334" ma:contentTypeVersion="5" ma:contentTypeDescription="Create a new document." ma:contentTypeScope="" ma:versionID="3c3cdac864ea44490d5feb2289df447b">
   <xsd:schema xmlns:xsd="http://www.w3.org/2001/XMLSchema" xmlns:p="http://schemas.microsoft.com/office/2006/metadata/properties" xmlns:ns2="305ed015-8565-4686-8245-5a6f6608d307" targetNamespace="http://schemas.microsoft.com/office/2006/metadata/properties" ma:root="true" ma:fieldsID="41e535ac8a181a7ae43b4c19f50876ca" ns2:_="">
     <xsd:import namespace="305ed015-8565-4686-8245-5a6f6608d307"/>
@@ -43817,28 +43832,30 @@
 </ct:contentTypeSchema>
 </file>
 
-<file path=customXml/item2.xml><?xml version="1.0" encoding="utf-8"?>
-<?mso-contentType ?>
-<FormTemplates xmlns="http://schemas.microsoft.com/sharepoint/v3/contenttype/forms">
-  <Display>DocumentLibraryForm</Display>
-  <Edit>DocumentLibraryForm</Edit>
-  <New>DocumentLibraryForm</New>
-</FormTemplates>
+<file path=customXml/itemProps1.xml><?xml version="1.0" encoding="utf-8"?>
+<ds:datastoreItem xmlns:ds="http://schemas.openxmlformats.org/officeDocument/2006/customXml" ds:itemID="{68E9ACD9-562C-4E45-98C9-78111DF73B73}">
+  <ds:schemaRefs>
+    <ds:schemaRef ds:uri="http://schemas.microsoft.com/sharepoint/v3/contenttype/forms"/>
+  </ds:schemaRefs>
+</ds:datastoreItem>
 </file>
 
-<file path=customXml/item3.xml><?xml version="1.0" encoding="utf-8"?>
-<p:properties xmlns:p="http://schemas.microsoft.com/office/2006/metadata/properties" xmlns:xsi="http://www.w3.org/2001/XMLSchema-instance">
-  <documentManagement>
-    <Typ_x0020__x0161_ablony xmlns="305ed015-8565-4686-8245-5a6f6608d307">Prezentace (Presentation)</Typ_x0020__x0161_ablony>
-    <Org_x0020_Jednotka xmlns="305ed015-8565-4686-8245-5a6f6608d307">ALL</Org_x0020_Jednotka>
-    <Jazyk xmlns="305ed015-8565-4686-8245-5a6f6608d307">CZ</Jazyk>
-    <Vlastn_x00ed_k xmlns="305ed015-8565-4686-8245-5a6f6608d307">CC</Vlastn_x00ed_k>
-    <T_x00e9_ma xmlns="305ed015-8565-4686-8245-5a6f6608d307">Marketing</T_x00e9_ma>
-  </documentManagement>
-</p:properties>
+<file path=customXml/itemProps2.xml><?xml version="1.0" encoding="utf-8"?>
+<ds:datastoreItem xmlns:ds="http://schemas.openxmlformats.org/officeDocument/2006/customXml" ds:itemID="{FA78BBDB-95CB-4C59-A8AB-58166EF53EC4}">
+  <ds:schemaRefs>
+    <ds:schemaRef ds:uri="http://purl.org/dc/dcmitype/"/>
+    <ds:schemaRef ds:uri="http://purl.org/dc/elements/1.1/"/>
+    <ds:schemaRef ds:uri="http://schemas.microsoft.com/office/2006/metadata/properties"/>
+    <ds:schemaRef ds:uri="http://schemas.microsoft.com/office/2006/documentManagement/types"/>
+    <ds:schemaRef ds:uri="305ed015-8565-4686-8245-5a6f6608d307"/>
+    <ds:schemaRef ds:uri="http://purl.org/dc/terms/"/>
+    <ds:schemaRef ds:uri="http://schemas.openxmlformats.org/package/2006/metadata/core-properties"/>
+    <ds:schemaRef ds:uri="http://www.w3.org/XML/1998/namespace"/>
+  </ds:schemaRefs>
+</ds:datastoreItem>
 </file>
 
-<file path=customXml/itemProps1.xml><?xml version="1.0" encoding="utf-8"?>
+<file path=customXml/itemProps3.xml><?xml version="1.0" encoding="utf-8"?>
 <ds:datastoreItem xmlns:ds="http://schemas.openxmlformats.org/officeDocument/2006/customXml" ds:itemID="{257903E7-1042-4F60-A78F-E2DF85502085}">
   <ds:schemaRefs>
     <ds:schemaRef ds:uri="http://schemas.microsoft.com/office/2006/metadata/contentType"/>
@@ -43853,27 +43870,4 @@
     <ds:schemaRef ds:uri="http://schemas.microsoft.com/office/internal/2005/internalDocumentation"/>
   </ds:schemaRefs>
 </ds:datastoreItem>
-</file>
-
-<file path=customXml/itemProps2.xml><?xml version="1.0" encoding="utf-8"?>
-<ds:datastoreItem xmlns:ds="http://schemas.openxmlformats.org/officeDocument/2006/customXml" ds:itemID="{68E9ACD9-562C-4E45-98C9-78111DF73B73}">
-  <ds:schemaRefs>
-    <ds:schemaRef ds:uri="http://schemas.microsoft.com/sharepoint/v3/contenttype/forms"/>
-  </ds:schemaRefs>
-</ds:datastoreItem>
-</file>
-
-<file path=customXml/itemProps3.xml><?xml version="1.0" encoding="utf-8"?>
-<ds:datastoreItem xmlns:ds="http://schemas.openxmlformats.org/officeDocument/2006/customXml" ds:itemID="{FA78BBDB-95CB-4C59-A8AB-58166EF53EC4}">
-  <ds:schemaRefs>
-    <ds:schemaRef ds:uri="http://purl.org/dc/dcmitype/"/>
-    <ds:schemaRef ds:uri="http://purl.org/dc/elements/1.1/"/>
-    <ds:schemaRef ds:uri="http://schemas.microsoft.com/office/2006/metadata/properties"/>
-    <ds:schemaRef ds:uri="http://schemas.microsoft.com/office/2006/documentManagement/types"/>
-    <ds:schemaRef ds:uri="305ed015-8565-4686-8245-5a6f6608d307"/>
-    <ds:schemaRef ds:uri="http://purl.org/dc/terms/"/>
-    <ds:schemaRef ds:uri="http://schemas.openxmlformats.org/package/2006/metadata/core-properties"/>
-    <ds:schemaRef ds:uri="http://www.w3.org/XML/1998/namespace"/>
-  </ds:schemaRefs>
-</ds:datastoreItem>
 </file>
</xml_diff>